<commit_message>
finalização da apresentação dos projetos
</commit_message>
<xml_diff>
--- a/Apresentação Cesup Rede/Projeto 2.pptx
+++ b/Apresentação Cesup Rede/Projeto 2.pptx
@@ -3254,8 +3254,15 @@
                 <a:latin typeface="Arial" panose="020B0604020202020204" pitchFamily="34" charset="0"/>
                 <a:cs typeface="Arial" panose="020B0604020202020204" pitchFamily="34" charset="0"/>
               </a:rPr>
-              <a:t>Informação Centralizada</a:t>
-            </a:r>
+              <a:t>Organizando as Informações</a:t>
+            </a:r>
+            <a:endParaRPr lang="pt-BR" sz="2800" b="1" dirty="0" smtClean="0">
+              <a:solidFill>
+                <a:srgbClr val="015CA2"/>
+              </a:solidFill>
+              <a:latin typeface="Arial" panose="020B0604020202020204" pitchFamily="34" charset="0"/>
+              <a:cs typeface="Arial" panose="020B0604020202020204" pitchFamily="34" charset="0"/>
+            </a:endParaRPr>
           </a:p>
         </p:txBody>
       </p:sp>
@@ -3374,7 +3381,6 @@
               <a:rPr lang="pt-BR" dirty="0" smtClean="0"/>
               <a:t>o relacionamento com o cliente.</a:t>
             </a:r>
-            <a:endParaRPr lang="pt-BR" dirty="0" smtClean="0"/>
           </a:p>
           <a:p>
             <a:endParaRPr lang="pt-PT" dirty="0"/>
@@ -3545,7 +3551,7 @@
         <p:spPr>
           <a:xfrm>
             <a:off x="913959" y="1854144"/>
-            <a:ext cx="7405791" cy="4154984"/>
+            <a:ext cx="7405791" cy="3785652"/>
           </a:xfrm>
           <a:prstGeom prst="rect">
             <a:avLst/>
@@ -3599,8 +3605,21 @@
             </a:r>
             <a:r>
               <a:rPr lang="pt-BR" sz="2400" dirty="0" smtClean="0"/>
-              <a:t>, Estudo de Solução, Reservas)</a:t>
-            </a:r>
+              <a:t>, Estudo de </a:t>
+            </a:r>
+            <a:r>
+              <a:rPr lang="pt-BR" sz="2400" dirty="0" smtClean="0"/>
+              <a:t>Solução</a:t>
+            </a:r>
+            <a:r>
+              <a:rPr lang="pt-BR" sz="2400" dirty="0" smtClean="0"/>
+              <a:t>..</a:t>
+            </a:r>
+            <a:r>
+              <a:rPr lang="pt-BR" sz="2400" dirty="0" smtClean="0"/>
+              <a:t>)</a:t>
+            </a:r>
+            <a:endParaRPr lang="pt-BR" sz="2400" dirty="0" smtClean="0"/>
           </a:p>
           <a:p>
             <a:endParaRPr lang="pt-PT" sz="2400" dirty="0" smtClean="0"/>
@@ -5862,8 +5881,13 @@
                   <a:srgbClr val="0070C0"/>
                 </a:solidFill>
               </a:rPr>
-              <a:t>Dashboard / Gráfico</a:t>
-            </a:r>
+              <a:t>Gráfico</a:t>
+            </a:r>
+            <a:endParaRPr lang="pt-PT" sz="1600" dirty="0" smtClean="0">
+              <a:solidFill>
+                <a:srgbClr val="0070C0"/>
+              </a:solidFill>
+            </a:endParaRPr>
           </a:p>
           <a:p>
             <a:pPr algn="ctr"/>
@@ -5934,7 +5958,7 @@
       </p:sp>
       <p:pic>
         <p:nvPicPr>
-          <p:cNvPr id="16" name="Imagem 15"/>
+          <p:cNvPr id="17" name="Imagem 16"/>
           <p:cNvPicPr>
             <a:picLocks noChangeAspect="1"/>
           </p:cNvPicPr>
@@ -5948,8 +5972,8 @@
         </p:blipFill>
         <p:spPr>
           <a:xfrm>
-            <a:off x="10751863" y="2228044"/>
-            <a:ext cx="285333" cy="262322"/>
+            <a:off x="10792241" y="3480883"/>
+            <a:ext cx="204576" cy="204576"/>
           </a:xfrm>
           <a:prstGeom prst="rect">
             <a:avLst/>
@@ -5958,7 +5982,7 @@
       </p:pic>
       <p:pic>
         <p:nvPicPr>
-          <p:cNvPr id="17" name="Imagem 16"/>
+          <p:cNvPr id="18" name="Imagem 17"/>
           <p:cNvPicPr>
             <a:picLocks noChangeAspect="1"/>
           </p:cNvPicPr>
@@ -5972,8 +5996,8 @@
         </p:blipFill>
         <p:spPr>
           <a:xfrm>
-            <a:off x="10792241" y="3480883"/>
-            <a:ext cx="204576" cy="204576"/>
+            <a:off x="6742083" y="4949080"/>
+            <a:ext cx="264017" cy="219184"/>
           </a:xfrm>
           <a:prstGeom prst="rect">
             <a:avLst/>
@@ -5982,7 +6006,7 @@
       </p:pic>
       <p:pic>
         <p:nvPicPr>
-          <p:cNvPr id="18" name="Imagem 17"/>
+          <p:cNvPr id="19" name="Imagem 18"/>
           <p:cNvPicPr>
             <a:picLocks noChangeAspect="1"/>
           </p:cNvPicPr>
@@ -5996,8 +6020,8 @@
         </p:blipFill>
         <p:spPr>
           <a:xfrm>
-            <a:off x="6742083" y="4949080"/>
-            <a:ext cx="264017" cy="219184"/>
+            <a:off x="10777622" y="4937252"/>
+            <a:ext cx="273888" cy="256770"/>
           </a:xfrm>
           <a:prstGeom prst="rect">
             <a:avLst/>
@@ -6006,7 +6030,7 @@
       </p:pic>
       <p:pic>
         <p:nvPicPr>
-          <p:cNvPr id="19" name="Imagem 18"/>
+          <p:cNvPr id="20" name="Imagem 19"/>
           <p:cNvPicPr>
             <a:picLocks noChangeAspect="1"/>
           </p:cNvPicPr>
@@ -6020,8 +6044,8 @@
         </p:blipFill>
         <p:spPr>
           <a:xfrm>
-            <a:off x="10777622" y="4937252"/>
-            <a:ext cx="273888" cy="256770"/>
+            <a:off x="6742083" y="3436935"/>
+            <a:ext cx="264017" cy="218942"/>
           </a:xfrm>
           <a:prstGeom prst="rect">
             <a:avLst/>
@@ -6030,7 +6054,7 @@
       </p:pic>
       <p:pic>
         <p:nvPicPr>
-          <p:cNvPr id="20" name="Imagem 19"/>
+          <p:cNvPr id="3" name="Imagem 2"/>
           <p:cNvPicPr>
             <a:picLocks noChangeAspect="1"/>
           </p:cNvPicPr>
@@ -6044,8 +6068,8 @@
         </p:blipFill>
         <p:spPr>
           <a:xfrm>
-            <a:off x="6742083" y="3436935"/>
-            <a:ext cx="264017" cy="218942"/>
+            <a:off x="10750196" y="2215164"/>
+            <a:ext cx="270388" cy="257198"/>
           </a:xfrm>
           <a:prstGeom prst="rect">
             <a:avLst/>
@@ -6390,8 +6414,8 @@
         </p:nvSpPr>
         <p:spPr>
           <a:xfrm>
-            <a:off x="795129" y="2234578"/>
-            <a:ext cx="11186652" cy="3046988"/>
+            <a:off x="875726" y="1912606"/>
+            <a:ext cx="10895564" cy="3416320"/>
           </a:xfrm>
           <a:prstGeom prst="rect">
             <a:avLst/>
@@ -6399,29 +6423,46 @@
           <a:noFill/>
         </p:spPr>
         <p:txBody>
-          <a:bodyPr wrap="none" rtlCol="0">
+          <a:bodyPr wrap="square" rtlCol="0">
             <a:spAutoFit/>
           </a:bodyPr>
           <a:lstStyle/>
           <a:p>
             <a:r>
+              <a:rPr lang="pt-BR" sz="2400" dirty="0" smtClean="0"/>
+              <a:t>- Ter </a:t>
+            </a:r>
+            <a:r>
               <a:rPr lang="pt-BR" sz="2400" dirty="0"/>
-              <a:t>Ter disponível em mãos diversas informações do cliente pode agilizar a prática do </a:t>
-            </a:r>
-            <a:endParaRPr lang="pt-BR" sz="2400" dirty="0" smtClean="0"/>
-          </a:p>
-          <a:p>
+              <a:t>disponível </a:t>
+            </a:r>
+            <a:r>
+              <a:rPr lang="pt-BR" sz="2400" dirty="0" smtClean="0"/>
+              <a:t>diversas informações unificadas da dependência, para </a:t>
+            </a:r>
+            <a:r>
+              <a:rPr lang="pt-BR" sz="2400" dirty="0"/>
+              <a:t>agilizar a </a:t>
+            </a:r>
+            <a:r>
+              <a:rPr lang="pt-BR" sz="2400" dirty="0"/>
+              <a:t> </a:t>
+            </a:r>
+            <a:r>
+              <a:rPr lang="pt-BR" sz="2400" dirty="0" smtClean="0"/>
+              <a:t>prática </a:t>
+            </a:r>
+            <a:r>
+              <a:rPr lang="pt-BR" sz="2400" dirty="0"/>
+              <a:t>do </a:t>
+            </a:r>
             <a:r>
               <a:rPr lang="pt-BR" sz="2400" dirty="0" smtClean="0"/>
               <a:t>atendimento </a:t>
             </a:r>
             <a:r>
               <a:rPr lang="pt-BR" sz="2400" dirty="0"/>
-              <a:t>e auxiliá-los com </a:t>
-            </a:r>
-            <a:r>
-              <a:rPr lang="pt-BR" sz="2400" dirty="0"/>
-              <a:t> </a:t>
+              <a:t>e auxiliá-los com  </a:t>
             </a:r>
             <a:r>
               <a:rPr lang="pt-BR" sz="2400" dirty="0" smtClean="0"/>
@@ -6437,15 +6478,27 @@
             </a:r>
           </a:p>
           <a:p>
-            <a:endParaRPr lang="pt-BR" sz="2400" dirty="0" smtClean="0"/>
-          </a:p>
-          <a:p>
             <a:endParaRPr lang="pt-BR" sz="2400" dirty="0"/>
           </a:p>
           <a:p>
+            <a:endParaRPr lang="pt-BR" sz="2400" dirty="0"/>
+          </a:p>
+          <a:p>
+            <a:r>
+              <a:rPr lang="pt-BR" sz="2400" dirty="0" smtClean="0"/>
+              <a:t>- Ao </a:t>
+            </a:r>
             <a:r>
               <a:rPr lang="pt-BR" sz="2400" dirty="0"/>
-              <a:t>Ao ter posse de informações relevantes sobre o seu consumidor, é possível segmentar e </a:t>
+              <a:t>ter posse de informações relevantes </a:t>
+            </a:r>
+            <a:r>
+              <a:rPr lang="pt-BR" sz="2400" dirty="0" smtClean="0"/>
+              <a:t>da dependência, </a:t>
+            </a:r>
+            <a:r>
+              <a:rPr lang="pt-BR" sz="2400" dirty="0"/>
+              <a:t>é possível segmentar e </a:t>
             </a:r>
             <a:endParaRPr lang="pt-BR" sz="2400" dirty="0" smtClean="0"/>
           </a:p>
@@ -6455,32 +6508,32 @@
               <a:t>agrupar </a:t>
             </a:r>
             <a:r>
-              <a:rPr lang="pt-BR" sz="2400" dirty="0"/>
-              <a:t>os clientes em </a:t>
-            </a:r>
-            <a:r>
-              <a:rPr lang="pt-BR" sz="2400" dirty="0"/>
-              <a:t> </a:t>
-            </a:r>
-            <a:r>
               <a:rPr lang="pt-BR" sz="2400" dirty="0" smtClean="0"/>
               <a:t>diferentes </a:t>
             </a:r>
             <a:r>
               <a:rPr lang="pt-BR" sz="2400" dirty="0"/>
-              <a:t>categorias, direcionando estrategicamente seus </a:t>
-            </a:r>
-            <a:endParaRPr lang="pt-BR" sz="2400" dirty="0" smtClean="0"/>
-          </a:p>
-          <a:p>
+              <a:t>categorias, direcionando estrategicamente </a:t>
+            </a:r>
             <a:r>
               <a:rPr lang="pt-BR" sz="2400" dirty="0" smtClean="0"/>
-              <a:t>produtos </a:t>
-            </a:r>
+              <a:t>campanhas, </a:t>
+            </a:r>
+          </a:p>
+          <a:p>
             <a:r>
               <a:rPr lang="pt-BR" sz="2400" dirty="0"/>
-              <a:t>ou serviços.</a:t>
-            </a:r>
+              <a:t>n</a:t>
+            </a:r>
+            <a:r>
+              <a:rPr lang="pt-BR" sz="2400" dirty="0" smtClean="0"/>
+              <a:t>otificações e </a:t>
+            </a:r>
+            <a:r>
+              <a:rPr lang="pt-BR" sz="2400" dirty="0" smtClean="0"/>
+              <a:t>serviços.</a:t>
+            </a:r>
+            <a:endParaRPr lang="pt-BR" sz="2400" dirty="0"/>
           </a:p>
           <a:p>
             <a:endParaRPr lang="pt-BR" sz="2400" dirty="0"/>

</xml_diff>

<commit_message>
apresentação dos projetos finalizados
</commit_message>
<xml_diff>
--- a/Apresentação Cesup Rede/Projeto 2.pptx
+++ b/Apresentação Cesup Rede/Projeto 2.pptx
@@ -251,7 +251,7 @@
           <a:p>
             <a:fld id="{451DA068-CB82-4A13-8DD8-5B6FC800C9FB}" type="datetimeFigureOut">
               <a:rPr lang="pt-BR" smtClean="0"/>
-              <a:t>15/11/2020</a:t>
+              <a:t>16/11/2020</a:t>
             </a:fld>
             <a:endParaRPr lang="pt-BR"/>
           </a:p>
@@ -421,7 +421,7 @@
           <a:p>
             <a:fld id="{451DA068-CB82-4A13-8DD8-5B6FC800C9FB}" type="datetimeFigureOut">
               <a:rPr lang="pt-BR" smtClean="0"/>
-              <a:t>15/11/2020</a:t>
+              <a:t>16/11/2020</a:t>
             </a:fld>
             <a:endParaRPr lang="pt-BR"/>
           </a:p>
@@ -601,7 +601,7 @@
           <a:p>
             <a:fld id="{451DA068-CB82-4A13-8DD8-5B6FC800C9FB}" type="datetimeFigureOut">
               <a:rPr lang="pt-BR" smtClean="0"/>
-              <a:t>15/11/2020</a:t>
+              <a:t>16/11/2020</a:t>
             </a:fld>
             <a:endParaRPr lang="pt-BR"/>
           </a:p>
@@ -898,7 +898,7 @@
           <a:p>
             <a:fld id="{451DA068-CB82-4A13-8DD8-5B6FC800C9FB}" type="datetimeFigureOut">
               <a:rPr lang="pt-BR" smtClean="0"/>
-              <a:t>15/11/2020</a:t>
+              <a:t>16/11/2020</a:t>
             </a:fld>
             <a:endParaRPr lang="pt-BR"/>
           </a:p>
@@ -1144,7 +1144,7 @@
           <a:p>
             <a:fld id="{451DA068-CB82-4A13-8DD8-5B6FC800C9FB}" type="datetimeFigureOut">
               <a:rPr lang="pt-BR" smtClean="0"/>
-              <a:t>15/11/2020</a:t>
+              <a:t>16/11/2020</a:t>
             </a:fld>
             <a:endParaRPr lang="pt-BR"/>
           </a:p>
@@ -1376,7 +1376,7 @@
           <a:p>
             <a:fld id="{451DA068-CB82-4A13-8DD8-5B6FC800C9FB}" type="datetimeFigureOut">
               <a:rPr lang="pt-BR" smtClean="0"/>
-              <a:t>15/11/2020</a:t>
+              <a:t>16/11/2020</a:t>
             </a:fld>
             <a:endParaRPr lang="pt-BR"/>
           </a:p>
@@ -1743,7 +1743,7 @@
           <a:p>
             <a:fld id="{451DA068-CB82-4A13-8DD8-5B6FC800C9FB}" type="datetimeFigureOut">
               <a:rPr lang="pt-BR" smtClean="0"/>
-              <a:t>15/11/2020</a:t>
+              <a:t>16/11/2020</a:t>
             </a:fld>
             <a:endParaRPr lang="pt-BR"/>
           </a:p>
@@ -1861,7 +1861,7 @@
           <a:p>
             <a:fld id="{451DA068-CB82-4A13-8DD8-5B6FC800C9FB}" type="datetimeFigureOut">
               <a:rPr lang="pt-BR" smtClean="0"/>
-              <a:t>15/11/2020</a:t>
+              <a:t>16/11/2020</a:t>
             </a:fld>
             <a:endParaRPr lang="pt-BR"/>
           </a:p>
@@ -1956,7 +1956,7 @@
           <a:p>
             <a:fld id="{451DA068-CB82-4A13-8DD8-5B6FC800C9FB}" type="datetimeFigureOut">
               <a:rPr lang="pt-BR" smtClean="0"/>
-              <a:t>15/11/2020</a:t>
+              <a:t>16/11/2020</a:t>
             </a:fld>
             <a:endParaRPr lang="pt-BR"/>
           </a:p>
@@ -2233,7 +2233,7 @@
           <a:p>
             <a:fld id="{451DA068-CB82-4A13-8DD8-5B6FC800C9FB}" type="datetimeFigureOut">
               <a:rPr lang="pt-BR" smtClean="0"/>
-              <a:t>15/11/2020</a:t>
+              <a:t>16/11/2020</a:t>
             </a:fld>
             <a:endParaRPr lang="pt-BR"/>
           </a:p>
@@ -2486,7 +2486,7 @@
           <a:p>
             <a:fld id="{451DA068-CB82-4A13-8DD8-5B6FC800C9FB}" type="datetimeFigureOut">
               <a:rPr lang="pt-BR" smtClean="0"/>
-              <a:t>15/11/2020</a:t>
+              <a:t>16/11/2020</a:t>
             </a:fld>
             <a:endParaRPr lang="pt-BR"/>
           </a:p>
@@ -2699,7 +2699,7 @@
           <a:p>
             <a:fld id="{451DA068-CB82-4A13-8DD8-5B6FC800C9FB}" type="datetimeFigureOut">
               <a:rPr lang="pt-BR" smtClean="0"/>
-              <a:t>15/11/2020</a:t>
+              <a:t>16/11/2020</a:t>
             </a:fld>
             <a:endParaRPr lang="pt-BR"/>
           </a:p>
@@ -3256,13 +3256,6 @@
               </a:rPr>
               <a:t>Organizando as Informações</a:t>
             </a:r>
-            <a:endParaRPr lang="pt-BR" sz="2800" b="1" dirty="0" smtClean="0">
-              <a:solidFill>
-                <a:srgbClr val="015CA2"/>
-              </a:solidFill>
-              <a:latin typeface="Arial" panose="020B0604020202020204" pitchFamily="34" charset="0"/>
-              <a:cs typeface="Arial" panose="020B0604020202020204" pitchFamily="34" charset="0"/>
-            </a:endParaRPr>
           </a:p>
         </p:txBody>
       </p:sp>
@@ -3551,7 +3544,7 @@
         <p:spPr>
           <a:xfrm>
             <a:off x="913959" y="1854144"/>
-            <a:ext cx="7405791" cy="3785652"/>
+            <a:ext cx="7405791" cy="4524315"/>
           </a:xfrm>
           <a:prstGeom prst="rect">
             <a:avLst/>
@@ -3596,30 +3589,37 @@
               <a:t>já demandou ao </a:t>
             </a:r>
             <a:r>
-              <a:rPr lang="pt-BR" sz="2400" dirty="0" err="1"/>
+              <a:rPr lang="pt-BR" sz="2400" dirty="0" err="1" smtClean="0"/>
               <a:t>Cesup</a:t>
             </a:r>
             <a:r>
+              <a:rPr lang="pt-BR" sz="2400" dirty="0" smtClean="0"/>
+              <a:t>, quais ferramentas dentro do </a:t>
+            </a:r>
+            <a:r>
+              <a:rPr lang="pt-BR" sz="2400" dirty="0" err="1" smtClean="0"/>
+              <a:t>Scap</a:t>
+            </a:r>
+            <a:r>
+              <a:rPr lang="pt-BR" sz="2400" dirty="0" smtClean="0"/>
+              <a:t> foram utilizados </a:t>
+            </a:r>
+            <a:r>
+              <a:rPr lang="pt-BR" sz="2400" dirty="0" smtClean="0"/>
+              <a:t>para </a:t>
+            </a:r>
+            <a:r>
+              <a:rPr lang="pt-BR" sz="2400" smtClean="0"/>
+              <a:t>o atendimento (Demandas</a:t>
+            </a:r>
+            <a:r>
               <a:rPr lang="pt-BR" sz="2400" dirty="0"/>
-              <a:t> (Demandas, Visitas</a:t>
+              <a:t>, Visitas</a:t>
             </a:r>
             <a:r>
               <a:rPr lang="pt-BR" sz="2400" dirty="0" smtClean="0"/>
-              <a:t>, Estudo de </a:t>
-            </a:r>
-            <a:r>
-              <a:rPr lang="pt-BR" sz="2400" dirty="0" smtClean="0"/>
-              <a:t>Solução</a:t>
-            </a:r>
-            <a:r>
-              <a:rPr lang="pt-BR" sz="2400" dirty="0" smtClean="0"/>
-              <a:t>..</a:t>
-            </a:r>
-            <a:r>
-              <a:rPr lang="pt-BR" sz="2400" dirty="0" smtClean="0"/>
-              <a:t>)</a:t>
-            </a:r>
-            <a:endParaRPr lang="pt-BR" sz="2400" dirty="0" smtClean="0"/>
+              <a:t>, Estudo de Solução..)</a:t>
+            </a:r>
           </a:p>
           <a:p>
             <a:endParaRPr lang="pt-PT" sz="2400" dirty="0" smtClean="0"/>
@@ -4487,7 +4487,7 @@
                   </a:schemeClr>
                 </a:solidFill>
               </a:rPr>
-              <a:t>Avaliação</a:t>
+              <a:t>Relacionamento</a:t>
             </a:r>
           </a:p>
           <a:p>
@@ -5772,7 +5772,7 @@
                   </a:schemeClr>
                 </a:solidFill>
               </a:rPr>
-              <a:t>Avaliação</a:t>
+              <a:t>Relacionamento</a:t>
             </a:r>
           </a:p>
           <a:p>
@@ -5883,11 +5883,6 @@
               </a:rPr>
               <a:t>Gráfico</a:t>
             </a:r>
-            <a:endParaRPr lang="pt-PT" sz="1600" dirty="0" smtClean="0">
-              <a:solidFill>
-                <a:srgbClr val="0070C0"/>
-              </a:solidFill>
-            </a:endParaRPr>
           </a:p>
           <a:p>
             <a:pPr algn="ctr"/>
@@ -6442,11 +6437,7 @@
             </a:r>
             <a:r>
               <a:rPr lang="pt-BR" sz="2400" dirty="0"/>
-              <a:t>agilizar a </a:t>
-            </a:r>
-            <a:r>
-              <a:rPr lang="pt-BR" sz="2400" dirty="0"/>
-              <a:t> </a:t>
+              <a:t>agilizar a  </a:t>
             </a:r>
             <a:r>
               <a:rPr lang="pt-BR" sz="2400" dirty="0" smtClean="0"/>
@@ -6505,11 +6496,7 @@
           <a:p>
             <a:r>
               <a:rPr lang="pt-BR" sz="2400" dirty="0" smtClean="0"/>
-              <a:t>agrupar </a:t>
-            </a:r>
-            <a:r>
-              <a:rPr lang="pt-BR" sz="2400" dirty="0" smtClean="0"/>
-              <a:t>diferentes </a:t>
+              <a:t>agrupar diferentes </a:t>
             </a:r>
             <a:r>
               <a:rPr lang="pt-BR" sz="2400" dirty="0"/>
@@ -6527,11 +6514,7 @@
             </a:r>
             <a:r>
               <a:rPr lang="pt-BR" sz="2400" dirty="0" smtClean="0"/>
-              <a:t>otificações e </a:t>
-            </a:r>
-            <a:r>
-              <a:rPr lang="pt-BR" sz="2400" dirty="0" smtClean="0"/>
-              <a:t>serviços.</a:t>
+              <a:t>otificações e serviços.</a:t>
             </a:r>
             <a:endParaRPr lang="pt-BR" sz="2400" dirty="0"/>
           </a:p>
@@ -6550,6 +6533,13 @@
   <p:clrMapOvr>
     <a:masterClrMapping/>
   </p:clrMapOvr>
+  <p:timing>
+    <p:tnLst>
+      <p:par>
+        <p:cTn id="1" dur="indefinite" restart="never" nodeType="tmRoot"/>
+      </p:par>
+    </p:tnLst>
+  </p:timing>
 </p:sld>
 </file>
 

</xml_diff>